<commit_message>
Small fix to comparison table in dil presentation
</commit_message>
<xml_diff>
--- a/Presentations/DoubleInstanceLocking.pptx
+++ b/Presentations/DoubleInstanceLocking.pptx
@@ -347,7 +347,7 @@
             <a:fld id="{1D8BD707-D9CF-40AE-B4C6-C98DA3205C09}" type="datetimeFigureOut">
               <a:rPr lang="en-US" smtClean="0"/>
               <a:pPr/>
-              <a:t>6/5/2014</a:t>
+              <a:t>5/21/2015</a:t>
             </a:fld>
             <a:endParaRPr lang="en-US"/>
           </a:p>
@@ -549,7 +549,7 @@
             <a:fld id="{1D8BD707-D9CF-40AE-B4C6-C98DA3205C09}" type="datetimeFigureOut">
               <a:rPr lang="en-US" smtClean="0"/>
               <a:pPr/>
-              <a:t>6/5/2014</a:t>
+              <a:t>5/21/2015</a:t>
             </a:fld>
             <a:endParaRPr lang="en-US"/>
           </a:p>
@@ -726,7 +726,7 @@
             <a:fld id="{1D8BD707-D9CF-40AE-B4C6-C98DA3205C09}" type="datetimeFigureOut">
               <a:rPr lang="en-US" smtClean="0"/>
               <a:pPr/>
-              <a:t>6/5/2014</a:t>
+              <a:t>5/21/2015</a:t>
             </a:fld>
             <a:endParaRPr lang="en-US"/>
           </a:p>
@@ -893,7 +893,7 @@
             <a:fld id="{1D8BD707-D9CF-40AE-B4C6-C98DA3205C09}" type="datetimeFigureOut">
               <a:rPr lang="en-US" smtClean="0"/>
               <a:pPr/>
-              <a:t>6/5/2014</a:t>
+              <a:t>5/21/2015</a:t>
             </a:fld>
             <a:endParaRPr lang="en-US"/>
           </a:p>
@@ -1143,7 +1143,7 @@
             <a:fld id="{1D8BD707-D9CF-40AE-B4C6-C98DA3205C09}" type="datetimeFigureOut">
               <a:rPr lang="en-US" smtClean="0"/>
               <a:pPr/>
-              <a:t>6/5/2014</a:t>
+              <a:t>5/21/2015</a:t>
             </a:fld>
             <a:endParaRPr lang="en-US"/>
           </a:p>
@@ -1463,7 +1463,7 @@
             <a:fld id="{1D8BD707-D9CF-40AE-B4C6-C98DA3205C09}" type="datetimeFigureOut">
               <a:rPr lang="en-US" smtClean="0"/>
               <a:pPr/>
-              <a:t>6/5/2014</a:t>
+              <a:t>5/21/2015</a:t>
             </a:fld>
             <a:endParaRPr lang="en-US"/>
           </a:p>
@@ -1931,7 +1931,7 @@
             <a:fld id="{1D8BD707-D9CF-40AE-B4C6-C98DA3205C09}" type="datetimeFigureOut">
               <a:rPr lang="en-US" smtClean="0"/>
               <a:pPr/>
-              <a:t>6/5/2014</a:t>
+              <a:t>5/21/2015</a:t>
             </a:fld>
             <a:endParaRPr lang="en-US"/>
           </a:p>
@@ -2081,7 +2081,7 @@
             <a:fld id="{1D8BD707-D9CF-40AE-B4C6-C98DA3205C09}" type="datetimeFigureOut">
               <a:rPr lang="en-US" smtClean="0"/>
               <a:pPr/>
-              <a:t>6/5/2014</a:t>
+              <a:t>5/21/2015</a:t>
             </a:fld>
             <a:endParaRPr lang="en-US"/>
           </a:p>
@@ -2173,7 +2173,7 @@
             <a:fld id="{1D8BD707-D9CF-40AE-B4C6-C98DA3205C09}" type="datetimeFigureOut">
               <a:rPr lang="en-US" smtClean="0"/>
               <a:pPr/>
-              <a:t>6/5/2014</a:t>
+              <a:t>5/21/2015</a:t>
             </a:fld>
             <a:endParaRPr lang="en-US"/>
           </a:p>
@@ -2449,7 +2449,7 @@
             <a:fld id="{1D8BD707-D9CF-40AE-B4C6-C98DA3205C09}" type="datetimeFigureOut">
               <a:rPr lang="en-US" smtClean="0"/>
               <a:pPr/>
-              <a:t>6/5/2014</a:t>
+              <a:t>5/21/2015</a:t>
             </a:fld>
             <a:endParaRPr lang="en-US"/>
           </a:p>
@@ -2756,7 +2756,7 @@
             <a:fld id="{1D8BD707-D9CF-40AE-B4C6-C98DA3205C09}" type="datetimeFigureOut">
               <a:rPr lang="en-US" smtClean="0"/>
               <a:pPr/>
-              <a:t>6/5/2014</a:t>
+              <a:t>5/21/2015</a:t>
             </a:fld>
             <a:endParaRPr lang="en-US"/>
           </a:p>
@@ -3056,7 +3056,7 @@
             <a:fld id="{1D8BD707-D9CF-40AE-B4C6-C98DA3205C09}" type="datetimeFigureOut">
               <a:rPr lang="en-US" smtClean="0"/>
               <a:pPr/>
-              <a:t>6/5/2014</a:t>
+              <a:t>5/21/2015</a:t>
             </a:fld>
             <a:endParaRPr lang="en-US"/>
           </a:p>
@@ -6872,17 +6872,23 @@
                     <a:lstStyle/>
                     <a:p>
                       <a:r>
-                        <a:rPr lang="en-US" sz="1200" dirty="0" smtClean="0">
+                        <a:rPr lang="en-US" sz="1200" kern="1200" smtClean="0">
                           <a:solidFill>
-                            <a:srgbClr val="00B050"/>
+                            <a:srgbClr val="FF0000"/>
                           </a:solidFill>
+                          <a:latin typeface="+mn-lt"/>
+                          <a:ea typeface="+mn-ea"/>
+                          <a:cs typeface="+mn-cs"/>
                         </a:rPr>
-                        <a:t>Lock-Free</a:t>
+                        <a:t>Blocking</a:t>
                       </a:r>
-                      <a:endParaRPr lang="en-US" sz="1200" dirty="0">
+                      <a:endParaRPr lang="en-US" sz="1200" kern="1200" dirty="0">
                         <a:solidFill>
-                          <a:srgbClr val="00B050"/>
+                          <a:srgbClr val="FF0000"/>
                         </a:solidFill>
+                        <a:latin typeface="+mn-lt"/>
+                        <a:ea typeface="+mn-ea"/>
+                        <a:cs typeface="+mn-cs"/>
                       </a:endParaRPr>
                     </a:p>
                   </a:txBody>

</xml_diff>